<commit_message>
Please enter the commit message for your changes. Lines starting  Changes to be committed: 	modified:   presentation/medicine.pptx
</commit_message>
<xml_diff>
--- a/presentation/medicine.pptx
+++ b/presentation/medicine.pptx
@@ -23126,7 +23126,7 @@
         </p:blipFill>
         <p:spPr>
           <a:xfrm>
-            <a:off x="3863143" y="3236040"/>
+            <a:off x="3875419" y="3236041"/>
             <a:ext cx="3503165" cy="2365770"/>
           </a:xfrm>
           <a:prstGeom prst="rect">
@@ -23209,7 +23209,7 @@
         <p:spPr>
           <a:xfrm>
             <a:off x="117629" y="91320"/>
-            <a:ext cx="6112276" cy="4247317"/>
+            <a:ext cx="8887826" cy="3693319"/>
           </a:xfrm>
           <a:prstGeom prst="rect">
             <a:avLst/>
@@ -23324,18 +23324,36 @@
                 <a:effectLst/>
                 <a:latin typeface="Segoe UI" panose="020B0502040204020203" pitchFamily="34" charset="0"/>
               </a:rPr>
-              <a:t>We can use the Lag function with common table expression, stored procedures, and functions for computation </a:t>
+              <a:t>We can use the Lag function with common table expression, stored procedures, and functions for computation purposes…….</a:t>
             </a:r>
+          </a:p>
+          <a:p>
+            <a:pPr algn="l" fontAlgn="base">
+              <a:buFont typeface="Arial" panose="020B0604020202020204" pitchFamily="34" charset="0"/>
+              <a:buChar char="•"/>
+            </a:pPr>
             <a:r>
-              <a:rPr lang="en-US" b="0" i="0">
+              <a:rPr lang="en-US">
                 <a:solidFill>
                   <a:srgbClr val="252525"/>
                 </a:solidFill>
-                <a:effectLst/>
                 <a:latin typeface="Segoe UI" panose="020B0502040204020203" pitchFamily="34" charset="0"/>
               </a:rPr>
-              <a:t>purposes…….</a:t>
+              <a:t>dsfggffdhgfh</a:t>
             </a:r>
+            <a:endParaRPr lang="en-US" b="0" i="0" dirty="0">
+              <a:solidFill>
+                <a:srgbClr val="252525"/>
+              </a:solidFill>
+              <a:effectLst/>
+              <a:latin typeface="Segoe UI" panose="020B0502040204020203" pitchFamily="34" charset="0"/>
+            </a:endParaRPr>
+          </a:p>
+          <a:p>
+            <a:pPr algn="l" fontAlgn="base">
+              <a:buFont typeface="Arial" panose="020B0604020202020204" pitchFamily="34" charset="0"/>
+              <a:buChar char="•"/>
+            </a:pPr>
             <a:endParaRPr lang="en-US" b="0" i="0" dirty="0">
               <a:solidFill>
                 <a:srgbClr val="252525"/>

</xml_diff>

<commit_message>
change ppt  Please enter the commit message for your changes. Lines starting  Changes to be committed: 	modified:   presentation/medicine.pptx
</commit_message>
<xml_diff>
--- a/presentation/medicine.pptx
+++ b/presentation/medicine.pptx
@@ -5,27 +5,28 @@
     <p:sldMasterId id="2147483648" r:id="rId1"/>
   </p:sldMasterIdLst>
   <p:notesMasterIdLst>
-    <p:notesMasterId r:id="rId17"/>
+    <p:notesMasterId r:id="rId18"/>
   </p:notesMasterIdLst>
   <p:handoutMasterIdLst>
-    <p:handoutMasterId r:id="rId18"/>
+    <p:handoutMasterId r:id="rId19"/>
   </p:handoutMasterIdLst>
   <p:sldIdLst>
     <p:sldId id="257" r:id="rId2"/>
-    <p:sldId id="258" r:id="rId3"/>
-    <p:sldId id="259" r:id="rId4"/>
-    <p:sldId id="275" r:id="rId5"/>
-    <p:sldId id="276" r:id="rId6"/>
-    <p:sldId id="272" r:id="rId7"/>
-    <p:sldId id="265" r:id="rId8"/>
-    <p:sldId id="260" r:id="rId9"/>
-    <p:sldId id="261" r:id="rId10"/>
-    <p:sldId id="266" r:id="rId11"/>
-    <p:sldId id="267" r:id="rId12"/>
-    <p:sldId id="262" r:id="rId13"/>
-    <p:sldId id="263" r:id="rId14"/>
-    <p:sldId id="264" r:id="rId15"/>
-    <p:sldId id="270" r:id="rId16"/>
+    <p:sldId id="277" r:id="rId3"/>
+    <p:sldId id="258" r:id="rId4"/>
+    <p:sldId id="259" r:id="rId5"/>
+    <p:sldId id="275" r:id="rId6"/>
+    <p:sldId id="276" r:id="rId7"/>
+    <p:sldId id="272" r:id="rId8"/>
+    <p:sldId id="265" r:id="rId9"/>
+    <p:sldId id="260" r:id="rId10"/>
+    <p:sldId id="261" r:id="rId11"/>
+    <p:sldId id="266" r:id="rId12"/>
+    <p:sldId id="267" r:id="rId13"/>
+    <p:sldId id="262" r:id="rId14"/>
+    <p:sldId id="263" r:id="rId15"/>
+    <p:sldId id="264" r:id="rId16"/>
+    <p:sldId id="270" r:id="rId17"/>
   </p:sldIdLst>
   <p:sldSz cx="12192000" cy="6858000"/>
   <p:notesSz cx="6858000" cy="9144000"/>
@@ -13016,6 +13017,836 @@
           <a:lstStyle/>
           <a:p>
             <a:r>
+              <a:rPr lang="en-US"/>
+              <a:t>Charts and Graphs</a:t>
+            </a:r>
+          </a:p>
+        </p:txBody>
+      </p:sp>
+      <p:sp>
+        <p:nvSpPr>
+          <p:cNvPr id="3" name="Rectangle 2" descr="legend">
+            <a:extLst>
+              <a:ext uri="{FF2B5EF4-FFF2-40B4-BE49-F238E27FC236}">
+                <a16:creationId xmlns:a16="http://schemas.microsoft.com/office/drawing/2014/main" id="{7D64EECE-959D-459E-BAFC-4E6C13A0DE32}"/>
+              </a:ext>
+              <a:ext uri="{C183D7F6-B498-43B3-948B-1728B52AA6E4}">
+                <adec:decorative xmlns:adec="http://schemas.microsoft.com/office/drawing/2017/decorative" val="1"/>
+              </a:ext>
+            </a:extLst>
+          </p:cNvPr>
+          <p:cNvSpPr/>
+          <p:nvPr/>
+        </p:nvSpPr>
+        <p:spPr>
+          <a:xfrm>
+            <a:off x="7804081" y="6308667"/>
+            <a:ext cx="4387919" cy="369332"/>
+          </a:xfrm>
+          <a:prstGeom prst="rect">
+            <a:avLst/>
+          </a:prstGeom>
+          <a:solidFill>
+            <a:schemeClr val="bg1">
+              <a:lumMod val="95000"/>
+            </a:schemeClr>
+          </a:solidFill>
+          <a:ln>
+            <a:noFill/>
+          </a:ln>
+        </p:spPr>
+        <p:style>
+          <a:lnRef idx="2">
+            <a:schemeClr val="accent1">
+              <a:shade val="50000"/>
+            </a:schemeClr>
+          </a:lnRef>
+          <a:fillRef idx="1">
+            <a:schemeClr val="accent1"/>
+          </a:fillRef>
+          <a:effectRef idx="0">
+            <a:schemeClr val="accent1"/>
+          </a:effectRef>
+          <a:fontRef idx="minor">
+            <a:schemeClr val="lt1"/>
+          </a:fontRef>
+        </p:style>
+        <p:txBody>
+          <a:bodyPr rtlCol="0" anchor="ctr"/>
+          <a:lstStyle/>
+          <a:p>
+            <a:pPr algn="ctr"/>
+            <a:endParaRPr lang="en-US"/>
+          </a:p>
+        </p:txBody>
+      </p:sp>
+      <p:grpSp>
+        <p:nvGrpSpPr>
+          <p:cNvPr id="21" name="Group 20" descr="Line Graph">
+            <a:extLst>
+              <a:ext uri="{FF2B5EF4-FFF2-40B4-BE49-F238E27FC236}">
+                <a16:creationId xmlns:a16="http://schemas.microsoft.com/office/drawing/2014/main" id="{5B4DBA8F-5BE8-408F-9E5D-87EF2EFA3971}"/>
+              </a:ext>
+            </a:extLst>
+          </p:cNvPr>
+          <p:cNvGrpSpPr/>
+          <p:nvPr/>
+        </p:nvGrpSpPr>
+        <p:grpSpPr>
+          <a:xfrm>
+            <a:off x="373030" y="622570"/>
+            <a:ext cx="11445940" cy="5938088"/>
+            <a:chOff x="99757" y="9487301"/>
+            <a:chExt cx="2686621" cy="2682329"/>
+          </a:xfrm>
+        </p:grpSpPr>
+        <p:graphicFrame>
+          <p:nvGraphicFramePr>
+            <p:cNvPr id="22" name="Chart 21">
+              <a:extLst>
+                <a:ext uri="{FF2B5EF4-FFF2-40B4-BE49-F238E27FC236}">
+                  <a16:creationId xmlns:a16="http://schemas.microsoft.com/office/drawing/2014/main" id="{E2AB20BC-4C16-4806-B45D-96781D18CCDC}"/>
+                </a:ext>
+              </a:extLst>
+            </p:cNvPr>
+            <p:cNvGraphicFramePr/>
+            <p:nvPr>
+              <p:extLst>
+                <p:ext uri="{D42A27DB-BD31-4B8C-83A1-F6EECF244321}">
+                  <p14:modId xmlns:p14="http://schemas.microsoft.com/office/powerpoint/2010/main" val="2962057140"/>
+                </p:ext>
+              </p:extLst>
+            </p:nvPr>
+          </p:nvGraphicFramePr>
+          <p:xfrm>
+            <a:off x="99757" y="9487301"/>
+            <a:ext cx="2673316" cy="2682329"/>
+          </p:xfrm>
+          <a:graphic>
+            <a:graphicData uri="http://schemas.openxmlformats.org/drawingml/2006/chart">
+              <c:chart xmlns:c="http://schemas.openxmlformats.org/drawingml/2006/chart" xmlns:r="http://schemas.openxmlformats.org/officeDocument/2006/relationships" r:id="rId2"/>
+            </a:graphicData>
+          </a:graphic>
+        </p:graphicFrame>
+        <p:sp>
+          <p:nvSpPr>
+            <p:cNvPr id="23" name="Callout: Bent Line 22">
+              <a:extLst>
+                <a:ext uri="{FF2B5EF4-FFF2-40B4-BE49-F238E27FC236}">
+                  <a16:creationId xmlns:a16="http://schemas.microsoft.com/office/drawing/2014/main" id="{9E073015-5DAD-4D34-9FF4-D7E34B0150C0}"/>
+                </a:ext>
+              </a:extLst>
+            </p:cNvPr>
+            <p:cNvSpPr/>
+            <p:nvPr/>
+          </p:nvSpPr>
+          <p:spPr>
+            <a:xfrm flipH="1">
+              <a:off x="1003220" y="10072261"/>
+              <a:ext cx="607731" cy="228287"/>
+            </a:xfrm>
+            <a:prstGeom prst="borderCallout2">
+              <a:avLst/>
+            </a:prstGeom>
+            <a:solidFill>
+              <a:schemeClr val="accent1">
+                <a:lumMod val="20000"/>
+                <a:lumOff val="80000"/>
+              </a:schemeClr>
+            </a:solidFill>
+            <a:ln>
+              <a:solidFill>
+                <a:schemeClr val="accent1">
+                  <a:lumMod val="60000"/>
+                  <a:lumOff val="40000"/>
+                </a:schemeClr>
+              </a:solidFill>
+            </a:ln>
+          </p:spPr>
+          <p:style>
+            <a:lnRef idx="2">
+              <a:schemeClr val="accent1">
+                <a:shade val="50000"/>
+              </a:schemeClr>
+            </a:lnRef>
+            <a:fillRef idx="1">
+              <a:schemeClr val="accent1"/>
+            </a:fillRef>
+            <a:effectRef idx="0">
+              <a:schemeClr val="accent1"/>
+            </a:effectRef>
+            <a:fontRef idx="minor">
+              <a:schemeClr val="lt1"/>
+            </a:fontRef>
+          </p:style>
+          <p:txBody>
+            <a:bodyPr rtlCol="0" anchor="ctr"/>
+            <a:lstStyle/>
+            <a:p>
+              <a:pPr algn="ctr"/>
+              <a:r>
+                <a:rPr lang="en-US" sz="1200" b="1">
+                  <a:solidFill>
+                    <a:schemeClr val="tx1"/>
+                  </a:solidFill>
+                  <a:latin typeface="+mj-lt"/>
+                </a:rPr>
+                <a:t>$2Bn</a:t>
+              </a:r>
+            </a:p>
+          </p:txBody>
+        </p:sp>
+        <p:sp>
+          <p:nvSpPr>
+            <p:cNvPr id="24" name="TextBox 23">
+              <a:extLst>
+                <a:ext uri="{FF2B5EF4-FFF2-40B4-BE49-F238E27FC236}">
+                  <a16:creationId xmlns:a16="http://schemas.microsoft.com/office/drawing/2014/main" id="{7B21AA84-6D52-4D75-82C7-48A99FC834ED}"/>
+                </a:ext>
+              </a:extLst>
+            </p:cNvPr>
+            <p:cNvSpPr txBox="1"/>
+            <p:nvPr/>
+          </p:nvSpPr>
+          <p:spPr>
+            <a:xfrm>
+              <a:off x="190821" y="11459852"/>
+              <a:ext cx="766317" cy="311150"/>
+            </a:xfrm>
+            <a:prstGeom prst="rect">
+              <a:avLst/>
+            </a:prstGeom>
+            <a:noFill/>
+          </p:spPr>
+          <p:txBody>
+            <a:bodyPr wrap="square" lIns="0" tIns="0" rIns="0" bIns="0" rtlCol="0" anchor="ctr">
+              <a:noAutofit/>
+            </a:bodyPr>
+            <a:lstStyle/>
+            <a:p>
+              <a:pPr algn="ctr"/>
+              <a:r>
+                <a:rPr lang="en-US" sz="1200">
+                  <a:latin typeface="+mj-lt"/>
+                  <a:cs typeface="Arial" panose="020B0604020202020204" pitchFamily="34" charset="0"/>
+                </a:rPr>
+                <a:t>20YY</a:t>
+              </a:r>
+            </a:p>
+          </p:txBody>
+        </p:sp>
+        <p:sp>
+          <p:nvSpPr>
+            <p:cNvPr id="25" name="TextBox 24">
+              <a:extLst>
+                <a:ext uri="{FF2B5EF4-FFF2-40B4-BE49-F238E27FC236}">
+                  <a16:creationId xmlns:a16="http://schemas.microsoft.com/office/drawing/2014/main" id="{22B5BAC7-89D5-41D2-A1E1-F0CA75077EA0}"/>
+                </a:ext>
+              </a:extLst>
+            </p:cNvPr>
+            <p:cNvSpPr txBox="1"/>
+            <p:nvPr/>
+          </p:nvSpPr>
+          <p:spPr>
+            <a:xfrm>
+              <a:off x="2020061" y="11459852"/>
+              <a:ext cx="766317" cy="311150"/>
+            </a:xfrm>
+            <a:prstGeom prst="rect">
+              <a:avLst/>
+            </a:prstGeom>
+            <a:noFill/>
+          </p:spPr>
+          <p:txBody>
+            <a:bodyPr wrap="square" lIns="0" tIns="0" rIns="0" bIns="0" rtlCol="0" anchor="ctr">
+              <a:noAutofit/>
+            </a:bodyPr>
+            <a:lstStyle/>
+            <a:p>
+              <a:pPr algn="ctr"/>
+              <a:r>
+                <a:rPr lang="en-US" sz="1200">
+                  <a:latin typeface="+mj-lt"/>
+                  <a:cs typeface="Arial" panose="020B0604020202020204" pitchFamily="34" charset="0"/>
+                </a:rPr>
+                <a:t>20YY</a:t>
+              </a:r>
+            </a:p>
+          </p:txBody>
+        </p:sp>
+      </p:grpSp>
+      <p:grpSp>
+        <p:nvGrpSpPr>
+          <p:cNvPr id="27" name="Group 26" descr="Legend">
+            <a:extLst>
+              <a:ext uri="{FF2B5EF4-FFF2-40B4-BE49-F238E27FC236}">
+                <a16:creationId xmlns:a16="http://schemas.microsoft.com/office/drawing/2014/main" id="{185941C3-F2C4-4ED9-8CCB-E54367B26F03}"/>
+              </a:ext>
+            </a:extLst>
+          </p:cNvPr>
+          <p:cNvGrpSpPr/>
+          <p:nvPr/>
+        </p:nvGrpSpPr>
+        <p:grpSpPr>
+          <a:xfrm>
+            <a:off x="8665608" y="6398736"/>
+            <a:ext cx="3140332" cy="189195"/>
+            <a:chOff x="463230" y="14650847"/>
+            <a:chExt cx="3140332" cy="189195"/>
+          </a:xfrm>
+        </p:grpSpPr>
+        <p:sp>
+          <p:nvSpPr>
+            <p:cNvPr id="28" name="TextBox 27">
+              <a:extLst>
+                <a:ext uri="{FF2B5EF4-FFF2-40B4-BE49-F238E27FC236}">
+                  <a16:creationId xmlns:a16="http://schemas.microsoft.com/office/drawing/2014/main" id="{12950859-3B08-45AC-9183-884B944FF29D}"/>
+                </a:ext>
+              </a:extLst>
+            </p:cNvPr>
+            <p:cNvSpPr txBox="1"/>
+            <p:nvPr/>
+          </p:nvSpPr>
+          <p:spPr>
+            <a:xfrm>
+              <a:off x="730693" y="14650847"/>
+              <a:ext cx="676286" cy="189195"/>
+            </a:xfrm>
+            <a:prstGeom prst="rect">
+              <a:avLst/>
+            </a:prstGeom>
+            <a:noFill/>
+          </p:spPr>
+          <p:txBody>
+            <a:bodyPr wrap="square" lIns="0" tIns="0" rIns="0" bIns="0" rtlCol="0">
+              <a:noAutofit/>
+            </a:bodyPr>
+            <a:lstStyle/>
+            <a:p>
+              <a:r>
+                <a:rPr lang="en-US" sz="1200">
+                  <a:latin typeface="+mj-lt"/>
+                </a:rPr>
+                <a:t>Data A</a:t>
+              </a:r>
+            </a:p>
+          </p:txBody>
+        </p:sp>
+        <p:sp>
+          <p:nvSpPr>
+            <p:cNvPr id="29" name="TextBox 28">
+              <a:extLst>
+                <a:ext uri="{FF2B5EF4-FFF2-40B4-BE49-F238E27FC236}">
+                  <a16:creationId xmlns:a16="http://schemas.microsoft.com/office/drawing/2014/main" id="{5A6B008C-B746-4D4D-8F60-B368B8FAEA1A}"/>
+                </a:ext>
+              </a:extLst>
+            </p:cNvPr>
+            <p:cNvSpPr txBox="1"/>
+            <p:nvPr/>
+          </p:nvSpPr>
+          <p:spPr>
+            <a:xfrm>
+              <a:off x="1807257" y="14650847"/>
+              <a:ext cx="676286" cy="189195"/>
+            </a:xfrm>
+            <a:prstGeom prst="rect">
+              <a:avLst/>
+            </a:prstGeom>
+            <a:noFill/>
+          </p:spPr>
+          <p:txBody>
+            <a:bodyPr wrap="square" lIns="0" tIns="0" rIns="0" bIns="0" rtlCol="0">
+              <a:noAutofit/>
+            </a:bodyPr>
+            <a:lstStyle/>
+            <a:p>
+              <a:r>
+                <a:rPr lang="en-US" sz="1200">
+                  <a:latin typeface="+mj-lt"/>
+                </a:rPr>
+                <a:t>Data B</a:t>
+              </a:r>
+            </a:p>
+          </p:txBody>
+        </p:sp>
+        <p:sp>
+          <p:nvSpPr>
+            <p:cNvPr id="30" name="Rectangle 29">
+              <a:extLst>
+                <a:ext uri="{FF2B5EF4-FFF2-40B4-BE49-F238E27FC236}">
+                  <a16:creationId xmlns:a16="http://schemas.microsoft.com/office/drawing/2014/main" id="{ACD1BF27-2213-45CE-A667-788F7924C22E}"/>
+                </a:ext>
+                <a:ext uri="{C183D7F6-B498-43B3-948B-1728B52AA6E4}">
+                  <adec:decorative xmlns:adec="http://schemas.microsoft.com/office/drawing/2017/decorative" val="1"/>
+                </a:ext>
+              </a:extLst>
+            </p:cNvPr>
+            <p:cNvSpPr/>
+            <p:nvPr/>
+          </p:nvSpPr>
+          <p:spPr>
+            <a:xfrm>
+              <a:off x="463230" y="14678120"/>
+              <a:ext cx="134649" cy="134649"/>
+            </a:xfrm>
+            <a:prstGeom prst="rect">
+              <a:avLst/>
+            </a:prstGeom>
+            <a:solidFill>
+              <a:schemeClr val="accent2"/>
+            </a:solidFill>
+            <a:ln w="22225">
+              <a:noFill/>
+            </a:ln>
+          </p:spPr>
+          <p:style>
+            <a:lnRef idx="2">
+              <a:schemeClr val="accent1">
+                <a:shade val="50000"/>
+              </a:schemeClr>
+            </a:lnRef>
+            <a:fillRef idx="1">
+              <a:schemeClr val="accent1"/>
+            </a:fillRef>
+            <a:effectRef idx="0">
+              <a:schemeClr val="accent1"/>
+            </a:effectRef>
+            <a:fontRef idx="minor">
+              <a:schemeClr val="lt1"/>
+            </a:fontRef>
+          </p:style>
+          <p:txBody>
+            <a:bodyPr rtlCol="0" anchor="ctr"/>
+            <a:lstStyle/>
+            <a:p>
+              <a:pPr algn="ctr"/>
+              <a:endParaRPr lang="en-US">
+                <a:solidFill>
+                  <a:schemeClr val="tx1"/>
+                </a:solidFill>
+                <a:latin typeface="+mj-lt"/>
+              </a:endParaRPr>
+            </a:p>
+          </p:txBody>
+        </p:sp>
+        <p:sp>
+          <p:nvSpPr>
+            <p:cNvPr id="31" name="Rectangle 30">
+              <a:extLst>
+                <a:ext uri="{FF2B5EF4-FFF2-40B4-BE49-F238E27FC236}">
+                  <a16:creationId xmlns:a16="http://schemas.microsoft.com/office/drawing/2014/main" id="{54F87B6B-A885-4EEB-8E55-6E1DA1BD0EA8}"/>
+                </a:ext>
+                <a:ext uri="{C183D7F6-B498-43B3-948B-1728B52AA6E4}">
+                  <adec:decorative xmlns:adec="http://schemas.microsoft.com/office/drawing/2017/decorative" val="1"/>
+                </a:ext>
+              </a:extLst>
+            </p:cNvPr>
+            <p:cNvSpPr/>
+            <p:nvPr/>
+          </p:nvSpPr>
+          <p:spPr>
+            <a:xfrm>
+              <a:off x="1539794" y="14678120"/>
+              <a:ext cx="134649" cy="134649"/>
+            </a:xfrm>
+            <a:prstGeom prst="rect">
+              <a:avLst/>
+            </a:prstGeom>
+            <a:solidFill>
+              <a:schemeClr val="accent4"/>
+            </a:solidFill>
+            <a:ln>
+              <a:noFill/>
+            </a:ln>
+          </p:spPr>
+          <p:style>
+            <a:lnRef idx="2">
+              <a:schemeClr val="accent1">
+                <a:shade val="50000"/>
+              </a:schemeClr>
+            </a:lnRef>
+            <a:fillRef idx="1">
+              <a:schemeClr val="accent1"/>
+            </a:fillRef>
+            <a:effectRef idx="0">
+              <a:schemeClr val="accent1"/>
+            </a:effectRef>
+            <a:fontRef idx="minor">
+              <a:schemeClr val="lt1"/>
+            </a:fontRef>
+          </p:style>
+          <p:txBody>
+            <a:bodyPr rtlCol="0" anchor="ctr"/>
+            <a:lstStyle/>
+            <a:p>
+              <a:pPr algn="ctr"/>
+              <a:endParaRPr lang="en-US">
+                <a:solidFill>
+                  <a:schemeClr val="tx1"/>
+                </a:solidFill>
+                <a:latin typeface="+mj-lt"/>
+              </a:endParaRPr>
+            </a:p>
+          </p:txBody>
+        </p:sp>
+        <p:sp>
+          <p:nvSpPr>
+            <p:cNvPr id="32" name="Rectangle 31">
+              <a:extLst>
+                <a:ext uri="{FF2B5EF4-FFF2-40B4-BE49-F238E27FC236}">
+                  <a16:creationId xmlns:a16="http://schemas.microsoft.com/office/drawing/2014/main" id="{EB4B2BC6-FC0E-4408-9491-47D196A52DE9}"/>
+                </a:ext>
+                <a:ext uri="{C183D7F6-B498-43B3-948B-1728B52AA6E4}">
+                  <adec:decorative xmlns:adec="http://schemas.microsoft.com/office/drawing/2017/decorative" val="1"/>
+                </a:ext>
+              </a:extLst>
+            </p:cNvPr>
+            <p:cNvSpPr/>
+            <p:nvPr/>
+          </p:nvSpPr>
+          <p:spPr>
+            <a:xfrm>
+              <a:off x="2616358" y="14678120"/>
+              <a:ext cx="134649" cy="134649"/>
+            </a:xfrm>
+            <a:prstGeom prst="rect">
+              <a:avLst/>
+            </a:prstGeom>
+            <a:solidFill>
+              <a:schemeClr val="accent5"/>
+            </a:solidFill>
+            <a:ln>
+              <a:noFill/>
+            </a:ln>
+          </p:spPr>
+          <p:style>
+            <a:lnRef idx="2">
+              <a:schemeClr val="accent1">
+                <a:shade val="50000"/>
+              </a:schemeClr>
+            </a:lnRef>
+            <a:fillRef idx="1">
+              <a:schemeClr val="accent1"/>
+            </a:fillRef>
+            <a:effectRef idx="0">
+              <a:schemeClr val="accent1"/>
+            </a:effectRef>
+            <a:fontRef idx="minor">
+              <a:schemeClr val="lt1"/>
+            </a:fontRef>
+          </p:style>
+          <p:txBody>
+            <a:bodyPr rtlCol="0" anchor="ctr"/>
+            <a:lstStyle/>
+            <a:p>
+              <a:pPr algn="ctr"/>
+              <a:endParaRPr lang="en-US">
+                <a:solidFill>
+                  <a:schemeClr val="tx1"/>
+                </a:solidFill>
+                <a:latin typeface="+mj-lt"/>
+              </a:endParaRPr>
+            </a:p>
+          </p:txBody>
+        </p:sp>
+        <p:sp>
+          <p:nvSpPr>
+            <p:cNvPr id="33" name="TextBox 32">
+              <a:extLst>
+                <a:ext uri="{FF2B5EF4-FFF2-40B4-BE49-F238E27FC236}">
+                  <a16:creationId xmlns:a16="http://schemas.microsoft.com/office/drawing/2014/main" id="{F7BC13C6-1FE2-4F17-B99D-CC390711E793}"/>
+                </a:ext>
+              </a:extLst>
+            </p:cNvPr>
+            <p:cNvSpPr txBox="1"/>
+            <p:nvPr/>
+          </p:nvSpPr>
+          <p:spPr>
+            <a:xfrm>
+              <a:off x="2927276" y="14650847"/>
+              <a:ext cx="676286" cy="189195"/>
+            </a:xfrm>
+            <a:prstGeom prst="rect">
+              <a:avLst/>
+            </a:prstGeom>
+            <a:noFill/>
+          </p:spPr>
+          <p:txBody>
+            <a:bodyPr wrap="square" lIns="0" tIns="0" rIns="0" bIns="0" rtlCol="0">
+              <a:noAutofit/>
+            </a:bodyPr>
+            <a:lstStyle/>
+            <a:p>
+              <a:r>
+                <a:rPr lang="en-US" sz="1200">
+                  <a:latin typeface="+mj-lt"/>
+                </a:rPr>
+                <a:t>Data C</a:t>
+              </a:r>
+            </a:p>
+          </p:txBody>
+        </p:sp>
+      </p:grpSp>
+      <p:sp>
+        <p:nvSpPr>
+          <p:cNvPr id="4" name="Slide Number Placeholder 3">
+            <a:extLst>
+              <a:ext uri="{FF2B5EF4-FFF2-40B4-BE49-F238E27FC236}">
+                <a16:creationId xmlns:a16="http://schemas.microsoft.com/office/drawing/2014/main" id="{903996C0-0A7C-4905-8FD4-EC23739737EE}"/>
+              </a:ext>
+            </a:extLst>
+          </p:cNvPr>
+          <p:cNvSpPr>
+            <a:spLocks noGrp="1"/>
+          </p:cNvSpPr>
+          <p:nvPr>
+            <p:ph type="sldNum" sz="quarter" idx="14"/>
+          </p:nvPr>
+        </p:nvSpPr>
+        <p:spPr>
+          <a:gradFill flip="none" rotWithShape="1">
+            <a:gsLst>
+              <a:gs pos="0">
+                <a:schemeClr val="accent2">
+                  <a:lumMod val="75000"/>
+                  <a:shade val="30000"/>
+                  <a:satMod val="115000"/>
+                </a:schemeClr>
+              </a:gs>
+              <a:gs pos="47000">
+                <a:schemeClr val="accent2">
+                  <a:lumMod val="75000"/>
+                  <a:shade val="67500"/>
+                  <a:satMod val="115000"/>
+                </a:schemeClr>
+              </a:gs>
+              <a:gs pos="100000">
+                <a:schemeClr val="accent1"/>
+              </a:gs>
+            </a:gsLst>
+            <a:lin ang="10800000" scaled="0"/>
+            <a:tileRect/>
+          </a:gradFill>
+        </p:spPr>
+        <p:txBody>
+          <a:bodyPr/>
+          <a:lstStyle/>
+          <a:p>
+            <a:fld id="{058DB212-BFA2-403F-85EF-DFD3FF6D973A}" type="slidenum">
+              <a:rPr lang="en-US" smtClean="0"/>
+              <a:pPr/>
+              <a:t>10</a:t>
+            </a:fld>
+            <a:endParaRPr lang="en-US"/>
+          </a:p>
+        </p:txBody>
+      </p:sp>
+      <p:sp>
+        <p:nvSpPr>
+          <p:cNvPr id="17" name="Slide Number Placeholder 7">
+            <a:extLst>
+              <a:ext uri="{FF2B5EF4-FFF2-40B4-BE49-F238E27FC236}">
+                <a16:creationId xmlns:a16="http://schemas.microsoft.com/office/drawing/2014/main" id="{6EC26857-9544-4562-AFF0-72E069063874}"/>
+              </a:ext>
+            </a:extLst>
+          </p:cNvPr>
+          <p:cNvSpPr txBox="1">
+            <a:spLocks/>
+          </p:cNvSpPr>
+          <p:nvPr/>
+        </p:nvSpPr>
+        <p:spPr>
+          <a:xfrm>
+            <a:off x="7806812" y="6689019"/>
+            <a:ext cx="3785419" cy="155729"/>
+          </a:xfrm>
+          <a:prstGeom prst="rect">
+            <a:avLst/>
+          </a:prstGeom>
+          <a:gradFill>
+            <a:gsLst>
+              <a:gs pos="87598">
+                <a:schemeClr val="accent5">
+                  <a:lumMod val="75000"/>
+                </a:schemeClr>
+              </a:gs>
+              <a:gs pos="0">
+                <a:schemeClr val="accent4">
+                  <a:lumMod val="60000"/>
+                  <a:lumOff val="40000"/>
+                </a:schemeClr>
+              </a:gs>
+              <a:gs pos="47000">
+                <a:schemeClr val="accent2">
+                  <a:lumMod val="75000"/>
+                  <a:shade val="67500"/>
+                  <a:satMod val="115000"/>
+                </a:schemeClr>
+              </a:gs>
+              <a:gs pos="100000">
+                <a:schemeClr val="accent1"/>
+              </a:gs>
+            </a:gsLst>
+            <a:lin ang="10800000" scaled="0"/>
+          </a:gradFill>
+        </p:spPr>
+        <p:txBody>
+          <a:bodyPr vert="horz" lIns="0" tIns="0" rIns="72000" bIns="0" rtlCol="0" anchor="ctr"/>
+          <a:lstStyle>
+            <a:defPPr>
+              <a:defRPr lang="en-US"/>
+            </a:defPPr>
+            <a:lvl1pPr marL="0" algn="r" defTabSz="914400" rtl="0" eaLnBrk="1" latinLnBrk="0" hangingPunct="1">
+              <a:defRPr sz="1200" kern="1200">
+                <a:solidFill>
+                  <a:schemeClr val="bg1"/>
+                </a:solidFill>
+                <a:latin typeface="+mj-lt"/>
+                <a:ea typeface="+mn-ea"/>
+                <a:cs typeface="+mn-cs"/>
+              </a:defRPr>
+            </a:lvl1pPr>
+            <a:lvl2pPr marL="457200" algn="l" defTabSz="914400" rtl="0" eaLnBrk="1" latinLnBrk="0" hangingPunct="1">
+              <a:defRPr sz="1800" kern="1200">
+                <a:solidFill>
+                  <a:schemeClr val="tx1"/>
+                </a:solidFill>
+                <a:latin typeface="+mn-lt"/>
+                <a:ea typeface="+mn-ea"/>
+                <a:cs typeface="+mn-cs"/>
+              </a:defRPr>
+            </a:lvl2pPr>
+            <a:lvl3pPr marL="914400" algn="l" defTabSz="914400" rtl="0" eaLnBrk="1" latinLnBrk="0" hangingPunct="1">
+              <a:defRPr sz="1800" kern="1200">
+                <a:solidFill>
+                  <a:schemeClr val="tx1"/>
+                </a:solidFill>
+                <a:latin typeface="+mn-lt"/>
+                <a:ea typeface="+mn-ea"/>
+                <a:cs typeface="+mn-cs"/>
+              </a:defRPr>
+            </a:lvl3pPr>
+            <a:lvl4pPr marL="1371600" algn="l" defTabSz="914400" rtl="0" eaLnBrk="1" latinLnBrk="0" hangingPunct="1">
+              <a:defRPr sz="1800" kern="1200">
+                <a:solidFill>
+                  <a:schemeClr val="tx1"/>
+                </a:solidFill>
+                <a:latin typeface="+mn-lt"/>
+                <a:ea typeface="+mn-ea"/>
+                <a:cs typeface="+mn-cs"/>
+              </a:defRPr>
+            </a:lvl4pPr>
+            <a:lvl5pPr marL="1828800" algn="l" defTabSz="914400" rtl="0" eaLnBrk="1" latinLnBrk="0" hangingPunct="1">
+              <a:defRPr sz="1800" kern="1200">
+                <a:solidFill>
+                  <a:schemeClr val="tx1"/>
+                </a:solidFill>
+                <a:latin typeface="+mn-lt"/>
+                <a:ea typeface="+mn-ea"/>
+                <a:cs typeface="+mn-cs"/>
+              </a:defRPr>
+            </a:lvl5pPr>
+            <a:lvl6pPr marL="2286000" algn="l" defTabSz="914400" rtl="0" eaLnBrk="1" latinLnBrk="0" hangingPunct="1">
+              <a:defRPr sz="1800" kern="1200">
+                <a:solidFill>
+                  <a:schemeClr val="tx1"/>
+                </a:solidFill>
+                <a:latin typeface="+mn-lt"/>
+                <a:ea typeface="+mn-ea"/>
+                <a:cs typeface="+mn-cs"/>
+              </a:defRPr>
+            </a:lvl6pPr>
+            <a:lvl7pPr marL="2743200" algn="l" defTabSz="914400" rtl="0" eaLnBrk="1" latinLnBrk="0" hangingPunct="1">
+              <a:defRPr sz="1800" kern="1200">
+                <a:solidFill>
+                  <a:schemeClr val="tx1"/>
+                </a:solidFill>
+                <a:latin typeface="+mn-lt"/>
+                <a:ea typeface="+mn-ea"/>
+                <a:cs typeface="+mn-cs"/>
+              </a:defRPr>
+            </a:lvl7pPr>
+            <a:lvl8pPr marL="3200400" algn="l" defTabSz="914400" rtl="0" eaLnBrk="1" latinLnBrk="0" hangingPunct="1">
+              <a:defRPr sz="1800" kern="1200">
+                <a:solidFill>
+                  <a:schemeClr val="tx1"/>
+                </a:solidFill>
+                <a:latin typeface="+mn-lt"/>
+                <a:ea typeface="+mn-ea"/>
+                <a:cs typeface="+mn-cs"/>
+              </a:defRPr>
+            </a:lvl8pPr>
+            <a:lvl9pPr marL="3657600" algn="l" defTabSz="914400" rtl="0" eaLnBrk="1" latinLnBrk="0" hangingPunct="1">
+              <a:defRPr sz="1800" kern="1200">
+                <a:solidFill>
+                  <a:schemeClr val="tx1"/>
+                </a:solidFill>
+                <a:latin typeface="+mn-lt"/>
+                <a:ea typeface="+mn-ea"/>
+                <a:cs typeface="+mn-cs"/>
+              </a:defRPr>
+            </a:lvl9pPr>
+          </a:lstStyle>
+          <a:p>
+            <a:r>
+              <a:rPr lang="en-US" dirty="0"/>
+              <a:t>PES Data Science Presentation</a:t>
+            </a:r>
+          </a:p>
+        </p:txBody>
+      </p:sp>
+    </p:spTree>
+    <p:extLst>
+      <p:ext uri="{BB962C8B-B14F-4D97-AF65-F5344CB8AC3E}">
+        <p14:creationId xmlns:p14="http://schemas.microsoft.com/office/powerpoint/2010/main" val="1177584907"/>
+      </p:ext>
+    </p:extLst>
+  </p:cSld>
+  <p:clrMapOvr>
+    <a:masterClrMapping/>
+  </p:clrMapOvr>
+</p:sld>
+</file>
+
+<file path=ppt/slides/slide11.xml><?xml version="1.0" encoding="utf-8"?>
+<p:sld xmlns:a="http://schemas.openxmlformats.org/drawingml/2006/main" xmlns:r="http://schemas.openxmlformats.org/officeDocument/2006/relationships" xmlns:p="http://schemas.openxmlformats.org/presentationml/2006/main">
+  <p:cSld>
+    <p:spTree>
+      <p:nvGrpSpPr>
+        <p:cNvPr id="1" name=""/>
+        <p:cNvGrpSpPr/>
+        <p:nvPr/>
+      </p:nvGrpSpPr>
+      <p:grpSpPr>
+        <a:xfrm>
+          <a:off x="0" y="0"/>
+          <a:ext cx="0" cy="0"/>
+          <a:chOff x="0" y="0"/>
+          <a:chExt cx="0" cy="0"/>
+        </a:xfrm>
+      </p:grpSpPr>
+      <p:sp>
+        <p:nvSpPr>
+          <p:cNvPr id="2" name="Title 1">
+            <a:extLst>
+              <a:ext uri="{FF2B5EF4-FFF2-40B4-BE49-F238E27FC236}">
+                <a16:creationId xmlns:a16="http://schemas.microsoft.com/office/drawing/2014/main" id="{A4CA33D0-A2F5-49D6-833F-C677390546EB}"/>
+              </a:ext>
+            </a:extLst>
+          </p:cNvPr>
+          <p:cNvSpPr>
+            <a:spLocks noGrp="1"/>
+          </p:cNvSpPr>
+          <p:nvPr>
+            <p:ph type="title"/>
+          </p:nvPr>
+        </p:nvSpPr>
+        <p:spPr/>
+        <p:txBody>
+          <a:bodyPr/>
+          <a:lstStyle/>
+          <a:p>
+            <a:r>
               <a:rPr lang="en-US" dirty="0"/>
               <a:t>Charts and Graphs 1</a:t>
             </a:r>
@@ -13878,7 +14709,7 @@
             <a:fld id="{058DB212-BFA2-403F-85EF-DFD3FF6D973A}" type="slidenum">
               <a:rPr lang="en-US" smtClean="0"/>
               <a:pPr/>
-              <a:t>10</a:t>
+              <a:t>11</a:t>
             </a:fld>
             <a:endParaRPr lang="en-US" dirty="0"/>
           </a:p>
@@ -14051,7 +14882,7 @@
 </p:sld>
 </file>
 
-<file path=ppt/slides/slide11.xml><?xml version="1.0" encoding="utf-8"?>
+<file path=ppt/slides/slide12.xml><?xml version="1.0" encoding="utf-8"?>
 <p:sld xmlns:a="http://schemas.openxmlformats.org/drawingml/2006/main" xmlns:r="http://schemas.openxmlformats.org/officeDocument/2006/relationships" xmlns:p="http://schemas.openxmlformats.org/presentationml/2006/main">
   <p:cSld>
     <p:spTree>
@@ -14541,7 +15372,7 @@
             <a:fld id="{058DB212-BFA2-403F-85EF-DFD3FF6D973A}" type="slidenum">
               <a:rPr lang="en-US" smtClean="0"/>
               <a:pPr/>
-              <a:t>11</a:t>
+              <a:t>12</a:t>
             </a:fld>
             <a:endParaRPr lang="en-US" dirty="0"/>
           </a:p>
@@ -14714,7 +15545,7 @@
 </p:sld>
 </file>
 
-<file path=ppt/slides/slide12.xml><?xml version="1.0" encoding="utf-8"?>
+<file path=ppt/slides/slide13.xml><?xml version="1.0" encoding="utf-8"?>
 <p:sld xmlns:a="http://schemas.openxmlformats.org/drawingml/2006/main" xmlns:r="http://schemas.openxmlformats.org/officeDocument/2006/relationships" xmlns:p="http://schemas.openxmlformats.org/presentationml/2006/main">
   <p:cSld>
     <p:spTree>
@@ -16018,7 +16849,7 @@
             <a:fld id="{058DB212-BFA2-403F-85EF-DFD3FF6D973A}" type="slidenum">
               <a:rPr lang="en-US" smtClean="0"/>
               <a:pPr/>
-              <a:t>12</a:t>
+              <a:t>13</a:t>
             </a:fld>
             <a:endParaRPr lang="en-US"/>
           </a:p>
@@ -16191,7 +17022,7 @@
 </p:sld>
 </file>
 
-<file path=ppt/slides/slide13.xml><?xml version="1.0" encoding="utf-8"?>
+<file path=ppt/slides/slide14.xml><?xml version="1.0" encoding="utf-8"?>
 <p:sld xmlns:a="http://schemas.openxmlformats.org/drawingml/2006/main" xmlns:r="http://schemas.openxmlformats.org/officeDocument/2006/relationships" xmlns:p="http://schemas.openxmlformats.org/presentationml/2006/main">
   <p:cSld>
     <p:spTree>
@@ -16260,7 +17091,7 @@
             <a:fld id="{058DB212-BFA2-403F-85EF-DFD3FF6D973A}" type="slidenum">
               <a:rPr lang="en-US" smtClean="0"/>
               <a:pPr/>
-              <a:t>13</a:t>
+              <a:t>14</a:t>
             </a:fld>
             <a:endParaRPr lang="en-US" dirty="0"/>
           </a:p>
@@ -16464,7 +17295,7 @@
 </p:sld>
 </file>
 
-<file path=ppt/slides/slide14.xml><?xml version="1.0" encoding="utf-8"?>
+<file path=ppt/slides/slide15.xml><?xml version="1.0" encoding="utf-8"?>
 <p:sld xmlns:a="http://schemas.openxmlformats.org/drawingml/2006/main" xmlns:r="http://schemas.openxmlformats.org/officeDocument/2006/relationships" xmlns:p="http://schemas.openxmlformats.org/presentationml/2006/main">
   <p:cSld>
     <p:spTree>
@@ -16583,7 +17414,7 @@
             <a:fld id="{058DB212-BFA2-403F-85EF-DFD3FF6D973A}" type="slidenum">
               <a:rPr lang="en-US" smtClean="0"/>
               <a:pPr/>
-              <a:t>14</a:t>
+              <a:t>15</a:t>
             </a:fld>
             <a:endParaRPr lang="en-US" dirty="0"/>
           </a:p>
@@ -16756,7 +17587,7 @@
 </p:sld>
 </file>
 
-<file path=ppt/slides/slide15.xml><?xml version="1.0" encoding="utf-8"?>
+<file path=ppt/slides/slide16.xml><?xml version="1.0" encoding="utf-8"?>
 <p:sld xmlns:a="http://schemas.openxmlformats.org/drawingml/2006/main" xmlns:r="http://schemas.openxmlformats.org/officeDocument/2006/relationships" xmlns:p="http://schemas.openxmlformats.org/presentationml/2006/main">
   <p:cSld>
     <p:spTree>
@@ -16825,7 +17656,7 @@
             <a:fld id="{058DB212-BFA2-403F-85EF-DFD3FF6D973A}" type="slidenum">
               <a:rPr lang="en-US" smtClean="0"/>
               <a:pPr/>
-              <a:t>15</a:t>
+              <a:t>16</a:t>
             </a:fld>
             <a:endParaRPr lang="en-US" dirty="0"/>
           </a:p>
@@ -19467,6 +20298,101 @@
       </p:grpSpPr>
       <p:sp>
         <p:nvSpPr>
+          <p:cNvPr id="2" name="Slide Number Placeholder 1">
+            <a:extLst>
+              <a:ext uri="{FF2B5EF4-FFF2-40B4-BE49-F238E27FC236}">
+                <a16:creationId xmlns:a16="http://schemas.microsoft.com/office/drawing/2014/main" id="{FDB56C9C-E88E-4805-9113-25ACD6747629}"/>
+              </a:ext>
+            </a:extLst>
+          </p:cNvPr>
+          <p:cNvSpPr>
+            <a:spLocks noGrp="1"/>
+          </p:cNvSpPr>
+          <p:nvPr>
+            <p:ph type="sldNum" sz="quarter" idx="11"/>
+          </p:nvPr>
+        </p:nvSpPr>
+        <p:spPr/>
+        <p:txBody>
+          <a:bodyPr/>
+          <a:lstStyle/>
+          <a:p>
+            <a:fld id="{058DB212-BFA2-403F-85EF-DFD3FF6D973A}" type="slidenum">
+              <a:rPr lang="en-US" noProof="0" smtClean="0"/>
+              <a:pPr/>
+              <a:t>2</a:t>
+            </a:fld>
+            <a:endParaRPr lang="en-US" noProof="0"/>
+          </a:p>
+        </p:txBody>
+      </p:sp>
+      <p:sp>
+        <p:nvSpPr>
+          <p:cNvPr id="4" name="TextBox 3">
+            <a:extLst>
+              <a:ext uri="{FF2B5EF4-FFF2-40B4-BE49-F238E27FC236}">
+                <a16:creationId xmlns:a16="http://schemas.microsoft.com/office/drawing/2014/main" id="{13BBDC52-0D75-4933-B357-349F010806B9}"/>
+              </a:ext>
+            </a:extLst>
+          </p:cNvPr>
+          <p:cNvSpPr txBox="1"/>
+          <p:nvPr/>
+        </p:nvSpPr>
+        <p:spPr>
+          <a:xfrm>
+            <a:off x="3044536" y="3147398"/>
+            <a:ext cx="6116782" cy="646331"/>
+          </a:xfrm>
+          <a:prstGeom prst="rect">
+            <a:avLst/>
+          </a:prstGeom>
+          <a:noFill/>
+        </p:spPr>
+        <p:txBody>
+          <a:bodyPr wrap="square">
+            <a:spAutoFit/>
+          </a:bodyPr>
+          <a:lstStyle/>
+          <a:p>
+            <a:r>
+              <a:rPr lang="en-IN" dirty="0"/>
+              <a:t>https://github.com/FathimaHafeez/SQL-PROJECT.git</a:t>
+            </a:r>
+          </a:p>
+        </p:txBody>
+      </p:sp>
+    </p:spTree>
+    <p:extLst>
+      <p:ext uri="{BB962C8B-B14F-4D97-AF65-F5344CB8AC3E}">
+        <p14:creationId xmlns:p14="http://schemas.microsoft.com/office/powerpoint/2010/main" val="1139961059"/>
+      </p:ext>
+    </p:extLst>
+  </p:cSld>
+  <p:clrMapOvr>
+    <a:masterClrMapping/>
+  </p:clrMapOvr>
+</p:sld>
+</file>
+
+<file path=ppt/slides/slide3.xml><?xml version="1.0" encoding="utf-8"?>
+<p:sld xmlns:a="http://schemas.openxmlformats.org/drawingml/2006/main" xmlns:r="http://schemas.openxmlformats.org/officeDocument/2006/relationships" xmlns:p="http://schemas.openxmlformats.org/presentationml/2006/main">
+  <p:cSld>
+    <p:spTree>
+      <p:nvGrpSpPr>
+        <p:cNvPr id="1" name=""/>
+        <p:cNvGrpSpPr/>
+        <p:nvPr/>
+      </p:nvGrpSpPr>
+      <p:grpSpPr>
+        <a:xfrm>
+          <a:off x="0" y="0"/>
+          <a:ext cx="0" cy="0"/>
+          <a:chOff x="0" y="0"/>
+          <a:chExt cx="0" cy="0"/>
+        </a:xfrm>
+      </p:grpSpPr>
+      <p:sp>
+        <p:nvSpPr>
           <p:cNvPr id="2" name="Title 1">
             <a:extLst>
               <a:ext uri="{FF2B5EF4-FFF2-40B4-BE49-F238E27FC236}">
@@ -19517,7 +20443,7 @@
             <a:fld id="{058DB212-BFA2-403F-85EF-DFD3FF6D973A}" type="slidenum">
               <a:rPr lang="en-US" smtClean="0"/>
               <a:pPr/>
-              <a:t>2</a:t>
+              <a:t>3</a:t>
             </a:fld>
             <a:endParaRPr lang="en-US" dirty="0"/>
           </a:p>
@@ -19720,7 +20646,7 @@
 </p:sld>
 </file>
 
-<file path=ppt/slides/slide3.xml><?xml version="1.0" encoding="utf-8"?>
+<file path=ppt/slides/slide4.xml><?xml version="1.0" encoding="utf-8"?>
 <p:sld xmlns:a="http://schemas.openxmlformats.org/drawingml/2006/main" xmlns:r="http://schemas.openxmlformats.org/officeDocument/2006/relationships" xmlns:p="http://schemas.openxmlformats.org/presentationml/2006/main">
   <p:cSld>
     <p:spTree>
@@ -19788,7 +20714,7 @@
           <a:p>
             <a:fld id="{058DB212-BFA2-403F-85EF-DFD3FF6D973A}" type="slidenum">
               <a:rPr lang="en-US" smtClean="0"/>
-              <a:t>3</a:t>
+              <a:t>4</a:t>
             </a:fld>
             <a:endParaRPr lang="en-US" dirty="0"/>
           </a:p>
@@ -22568,7 +23494,7 @@
 </p:sld>
 </file>
 
-<file path=ppt/slides/slide4.xml><?xml version="1.0" encoding="utf-8"?>
+<file path=ppt/slides/slide5.xml><?xml version="1.0" encoding="utf-8"?>
 <p:sld xmlns:a="http://schemas.openxmlformats.org/drawingml/2006/main" xmlns:r="http://schemas.openxmlformats.org/officeDocument/2006/relationships" xmlns:p="http://schemas.openxmlformats.org/presentationml/2006/main">
   <p:cSld>
     <p:spTree>
@@ -22609,7 +23535,7 @@
             <a:fld id="{058DB212-BFA2-403F-85EF-DFD3FF6D973A}" type="slidenum">
               <a:rPr lang="en-US" noProof="0" smtClean="0"/>
               <a:pPr/>
-              <a:t>4</a:t>
+              <a:t>5</a:t>
             </a:fld>
             <a:endParaRPr lang="en-US" noProof="0"/>
           </a:p>
@@ -23147,7 +24073,7 @@
 </p:sld>
 </file>
 
-<file path=ppt/slides/slide5.xml><?xml version="1.0" encoding="utf-8"?>
+<file path=ppt/slides/slide6.xml><?xml version="1.0" encoding="utf-8"?>
 <p:sld xmlns:a="http://schemas.openxmlformats.org/drawingml/2006/main" xmlns:r="http://schemas.openxmlformats.org/officeDocument/2006/relationships" xmlns:p="http://schemas.openxmlformats.org/presentationml/2006/main">
   <p:cSld>
     <p:spTree>
@@ -23188,7 +24114,7 @@
             <a:fld id="{058DB212-BFA2-403F-85EF-DFD3FF6D973A}" type="slidenum">
               <a:rPr lang="en-US" noProof="0" smtClean="0"/>
               <a:pPr/>
-              <a:t>5</a:t>
+              <a:t>6</a:t>
             </a:fld>
             <a:endParaRPr lang="en-US" noProof="0"/>
           </a:p>
@@ -23377,7 +24303,7 @@
 </p:sld>
 </file>
 
-<file path=ppt/slides/slide6.xml><?xml version="1.0" encoding="utf-8"?>
+<file path=ppt/slides/slide7.xml><?xml version="1.0" encoding="utf-8"?>
 <p:sld xmlns:a="http://schemas.openxmlformats.org/drawingml/2006/main" xmlns:r="http://schemas.openxmlformats.org/officeDocument/2006/relationships" xmlns:p="http://schemas.openxmlformats.org/presentationml/2006/main">
   <p:cSld>
     <p:spTree>
@@ -23617,7 +24543,7 @@
             <a:fld id="{058DB212-BFA2-403F-85EF-DFD3FF6D973A}" type="slidenum">
               <a:rPr lang="en-US" noProof="0" smtClean="0"/>
               <a:pPr/>
-              <a:t>6</a:t>
+              <a:t>7</a:t>
             </a:fld>
             <a:endParaRPr lang="en-US" noProof="0"/>
           </a:p>
@@ -23726,7 +24652,7 @@
 </p:sld>
 </file>
 
-<file path=ppt/slides/slide7.xml><?xml version="1.0" encoding="utf-8"?>
+<file path=ppt/slides/slide8.xml><?xml version="1.0" encoding="utf-8"?>
 <p:sld xmlns:a="http://schemas.openxmlformats.org/drawingml/2006/main" xmlns:r="http://schemas.openxmlformats.org/officeDocument/2006/relationships" xmlns:p="http://schemas.openxmlformats.org/presentationml/2006/main">
   <p:cSld>
     <p:spTree>
@@ -26067,7 +26993,7 @@
 </p:sld>
 </file>
 
-<file path=ppt/slides/slide8.xml><?xml version="1.0" encoding="utf-8"?>
+<file path=ppt/slides/slide9.xml><?xml version="1.0" encoding="utf-8"?>
 <p:sld xmlns:a="http://schemas.openxmlformats.org/drawingml/2006/main" xmlns:r="http://schemas.openxmlformats.org/officeDocument/2006/relationships" xmlns:p="http://schemas.openxmlformats.org/presentationml/2006/main">
   <p:cSld>
     <p:spTree>
@@ -26355,7 +27281,7 @@
             <a:fld id="{058DB212-BFA2-403F-85EF-DFD3FF6D973A}" type="slidenum">
               <a:rPr lang="en-US" smtClean="0"/>
               <a:pPr/>
-              <a:t>8</a:t>
+              <a:t>9</a:t>
             </a:fld>
             <a:endParaRPr lang="en-US" dirty="0"/>
           </a:p>
@@ -26745,836 +27671,6 @@
     <p:extLst>
       <p:ext uri="{BB962C8B-B14F-4D97-AF65-F5344CB8AC3E}">
         <p14:creationId xmlns:p14="http://schemas.microsoft.com/office/powerpoint/2010/main" val="1858038096"/>
-      </p:ext>
-    </p:extLst>
-  </p:cSld>
-  <p:clrMapOvr>
-    <a:masterClrMapping/>
-  </p:clrMapOvr>
-</p:sld>
-</file>
-
-<file path=ppt/slides/slide9.xml><?xml version="1.0" encoding="utf-8"?>
-<p:sld xmlns:a="http://schemas.openxmlformats.org/drawingml/2006/main" xmlns:r="http://schemas.openxmlformats.org/officeDocument/2006/relationships" xmlns:p="http://schemas.openxmlformats.org/presentationml/2006/main">
-  <p:cSld>
-    <p:spTree>
-      <p:nvGrpSpPr>
-        <p:cNvPr id="1" name=""/>
-        <p:cNvGrpSpPr/>
-        <p:nvPr/>
-      </p:nvGrpSpPr>
-      <p:grpSpPr>
-        <a:xfrm>
-          <a:off x="0" y="0"/>
-          <a:ext cx="0" cy="0"/>
-          <a:chOff x="0" y="0"/>
-          <a:chExt cx="0" cy="0"/>
-        </a:xfrm>
-      </p:grpSpPr>
-      <p:sp>
-        <p:nvSpPr>
-          <p:cNvPr id="2" name="Title 1">
-            <a:extLst>
-              <a:ext uri="{FF2B5EF4-FFF2-40B4-BE49-F238E27FC236}">
-                <a16:creationId xmlns:a16="http://schemas.microsoft.com/office/drawing/2014/main" id="{A4CA33D0-A2F5-49D6-833F-C677390546EB}"/>
-              </a:ext>
-            </a:extLst>
-          </p:cNvPr>
-          <p:cNvSpPr>
-            <a:spLocks noGrp="1"/>
-          </p:cNvSpPr>
-          <p:nvPr>
-            <p:ph type="title"/>
-          </p:nvPr>
-        </p:nvSpPr>
-        <p:spPr/>
-        <p:txBody>
-          <a:bodyPr/>
-          <a:lstStyle/>
-          <a:p>
-            <a:r>
-              <a:rPr lang="en-US"/>
-              <a:t>Charts and Graphs</a:t>
-            </a:r>
-          </a:p>
-        </p:txBody>
-      </p:sp>
-      <p:sp>
-        <p:nvSpPr>
-          <p:cNvPr id="3" name="Rectangle 2" descr="legend">
-            <a:extLst>
-              <a:ext uri="{FF2B5EF4-FFF2-40B4-BE49-F238E27FC236}">
-                <a16:creationId xmlns:a16="http://schemas.microsoft.com/office/drawing/2014/main" id="{7D64EECE-959D-459E-BAFC-4E6C13A0DE32}"/>
-              </a:ext>
-              <a:ext uri="{C183D7F6-B498-43B3-948B-1728B52AA6E4}">
-                <adec:decorative xmlns:adec="http://schemas.microsoft.com/office/drawing/2017/decorative" val="1"/>
-              </a:ext>
-            </a:extLst>
-          </p:cNvPr>
-          <p:cNvSpPr/>
-          <p:nvPr/>
-        </p:nvSpPr>
-        <p:spPr>
-          <a:xfrm>
-            <a:off x="7804081" y="6308667"/>
-            <a:ext cx="4387919" cy="369332"/>
-          </a:xfrm>
-          <a:prstGeom prst="rect">
-            <a:avLst/>
-          </a:prstGeom>
-          <a:solidFill>
-            <a:schemeClr val="bg1">
-              <a:lumMod val="95000"/>
-            </a:schemeClr>
-          </a:solidFill>
-          <a:ln>
-            <a:noFill/>
-          </a:ln>
-        </p:spPr>
-        <p:style>
-          <a:lnRef idx="2">
-            <a:schemeClr val="accent1">
-              <a:shade val="50000"/>
-            </a:schemeClr>
-          </a:lnRef>
-          <a:fillRef idx="1">
-            <a:schemeClr val="accent1"/>
-          </a:fillRef>
-          <a:effectRef idx="0">
-            <a:schemeClr val="accent1"/>
-          </a:effectRef>
-          <a:fontRef idx="minor">
-            <a:schemeClr val="lt1"/>
-          </a:fontRef>
-        </p:style>
-        <p:txBody>
-          <a:bodyPr rtlCol="0" anchor="ctr"/>
-          <a:lstStyle/>
-          <a:p>
-            <a:pPr algn="ctr"/>
-            <a:endParaRPr lang="en-US"/>
-          </a:p>
-        </p:txBody>
-      </p:sp>
-      <p:grpSp>
-        <p:nvGrpSpPr>
-          <p:cNvPr id="21" name="Group 20" descr="Line Graph">
-            <a:extLst>
-              <a:ext uri="{FF2B5EF4-FFF2-40B4-BE49-F238E27FC236}">
-                <a16:creationId xmlns:a16="http://schemas.microsoft.com/office/drawing/2014/main" id="{5B4DBA8F-5BE8-408F-9E5D-87EF2EFA3971}"/>
-              </a:ext>
-            </a:extLst>
-          </p:cNvPr>
-          <p:cNvGrpSpPr/>
-          <p:nvPr/>
-        </p:nvGrpSpPr>
-        <p:grpSpPr>
-          <a:xfrm>
-            <a:off x="373030" y="622570"/>
-            <a:ext cx="11445940" cy="5938088"/>
-            <a:chOff x="99757" y="9487301"/>
-            <a:chExt cx="2686621" cy="2682329"/>
-          </a:xfrm>
-        </p:grpSpPr>
-        <p:graphicFrame>
-          <p:nvGraphicFramePr>
-            <p:cNvPr id="22" name="Chart 21">
-              <a:extLst>
-                <a:ext uri="{FF2B5EF4-FFF2-40B4-BE49-F238E27FC236}">
-                  <a16:creationId xmlns:a16="http://schemas.microsoft.com/office/drawing/2014/main" id="{E2AB20BC-4C16-4806-B45D-96781D18CCDC}"/>
-                </a:ext>
-              </a:extLst>
-            </p:cNvPr>
-            <p:cNvGraphicFramePr/>
-            <p:nvPr>
-              <p:extLst>
-                <p:ext uri="{D42A27DB-BD31-4B8C-83A1-F6EECF244321}">
-                  <p14:modId xmlns:p14="http://schemas.microsoft.com/office/powerpoint/2010/main" val="2962057140"/>
-                </p:ext>
-              </p:extLst>
-            </p:nvPr>
-          </p:nvGraphicFramePr>
-          <p:xfrm>
-            <a:off x="99757" y="9487301"/>
-            <a:ext cx="2673316" cy="2682329"/>
-          </p:xfrm>
-          <a:graphic>
-            <a:graphicData uri="http://schemas.openxmlformats.org/drawingml/2006/chart">
-              <c:chart xmlns:c="http://schemas.openxmlformats.org/drawingml/2006/chart" xmlns:r="http://schemas.openxmlformats.org/officeDocument/2006/relationships" r:id="rId2"/>
-            </a:graphicData>
-          </a:graphic>
-        </p:graphicFrame>
-        <p:sp>
-          <p:nvSpPr>
-            <p:cNvPr id="23" name="Callout: Bent Line 22">
-              <a:extLst>
-                <a:ext uri="{FF2B5EF4-FFF2-40B4-BE49-F238E27FC236}">
-                  <a16:creationId xmlns:a16="http://schemas.microsoft.com/office/drawing/2014/main" id="{9E073015-5DAD-4D34-9FF4-D7E34B0150C0}"/>
-                </a:ext>
-              </a:extLst>
-            </p:cNvPr>
-            <p:cNvSpPr/>
-            <p:nvPr/>
-          </p:nvSpPr>
-          <p:spPr>
-            <a:xfrm flipH="1">
-              <a:off x="1003220" y="10072261"/>
-              <a:ext cx="607731" cy="228287"/>
-            </a:xfrm>
-            <a:prstGeom prst="borderCallout2">
-              <a:avLst/>
-            </a:prstGeom>
-            <a:solidFill>
-              <a:schemeClr val="accent1">
-                <a:lumMod val="20000"/>
-                <a:lumOff val="80000"/>
-              </a:schemeClr>
-            </a:solidFill>
-            <a:ln>
-              <a:solidFill>
-                <a:schemeClr val="accent1">
-                  <a:lumMod val="60000"/>
-                  <a:lumOff val="40000"/>
-                </a:schemeClr>
-              </a:solidFill>
-            </a:ln>
-          </p:spPr>
-          <p:style>
-            <a:lnRef idx="2">
-              <a:schemeClr val="accent1">
-                <a:shade val="50000"/>
-              </a:schemeClr>
-            </a:lnRef>
-            <a:fillRef idx="1">
-              <a:schemeClr val="accent1"/>
-            </a:fillRef>
-            <a:effectRef idx="0">
-              <a:schemeClr val="accent1"/>
-            </a:effectRef>
-            <a:fontRef idx="minor">
-              <a:schemeClr val="lt1"/>
-            </a:fontRef>
-          </p:style>
-          <p:txBody>
-            <a:bodyPr rtlCol="0" anchor="ctr"/>
-            <a:lstStyle/>
-            <a:p>
-              <a:pPr algn="ctr"/>
-              <a:r>
-                <a:rPr lang="en-US" sz="1200" b="1">
-                  <a:solidFill>
-                    <a:schemeClr val="tx1"/>
-                  </a:solidFill>
-                  <a:latin typeface="+mj-lt"/>
-                </a:rPr>
-                <a:t>$2Bn</a:t>
-              </a:r>
-            </a:p>
-          </p:txBody>
-        </p:sp>
-        <p:sp>
-          <p:nvSpPr>
-            <p:cNvPr id="24" name="TextBox 23">
-              <a:extLst>
-                <a:ext uri="{FF2B5EF4-FFF2-40B4-BE49-F238E27FC236}">
-                  <a16:creationId xmlns:a16="http://schemas.microsoft.com/office/drawing/2014/main" id="{7B21AA84-6D52-4D75-82C7-48A99FC834ED}"/>
-                </a:ext>
-              </a:extLst>
-            </p:cNvPr>
-            <p:cNvSpPr txBox="1"/>
-            <p:nvPr/>
-          </p:nvSpPr>
-          <p:spPr>
-            <a:xfrm>
-              <a:off x="190821" y="11459852"/>
-              <a:ext cx="766317" cy="311150"/>
-            </a:xfrm>
-            <a:prstGeom prst="rect">
-              <a:avLst/>
-            </a:prstGeom>
-            <a:noFill/>
-          </p:spPr>
-          <p:txBody>
-            <a:bodyPr wrap="square" lIns="0" tIns="0" rIns="0" bIns="0" rtlCol="0" anchor="ctr">
-              <a:noAutofit/>
-            </a:bodyPr>
-            <a:lstStyle/>
-            <a:p>
-              <a:pPr algn="ctr"/>
-              <a:r>
-                <a:rPr lang="en-US" sz="1200">
-                  <a:latin typeface="+mj-lt"/>
-                  <a:cs typeface="Arial" panose="020B0604020202020204" pitchFamily="34" charset="0"/>
-                </a:rPr>
-                <a:t>20YY</a:t>
-              </a:r>
-            </a:p>
-          </p:txBody>
-        </p:sp>
-        <p:sp>
-          <p:nvSpPr>
-            <p:cNvPr id="25" name="TextBox 24">
-              <a:extLst>
-                <a:ext uri="{FF2B5EF4-FFF2-40B4-BE49-F238E27FC236}">
-                  <a16:creationId xmlns:a16="http://schemas.microsoft.com/office/drawing/2014/main" id="{22B5BAC7-89D5-41D2-A1E1-F0CA75077EA0}"/>
-                </a:ext>
-              </a:extLst>
-            </p:cNvPr>
-            <p:cNvSpPr txBox="1"/>
-            <p:nvPr/>
-          </p:nvSpPr>
-          <p:spPr>
-            <a:xfrm>
-              <a:off x="2020061" y="11459852"/>
-              <a:ext cx="766317" cy="311150"/>
-            </a:xfrm>
-            <a:prstGeom prst="rect">
-              <a:avLst/>
-            </a:prstGeom>
-            <a:noFill/>
-          </p:spPr>
-          <p:txBody>
-            <a:bodyPr wrap="square" lIns="0" tIns="0" rIns="0" bIns="0" rtlCol="0" anchor="ctr">
-              <a:noAutofit/>
-            </a:bodyPr>
-            <a:lstStyle/>
-            <a:p>
-              <a:pPr algn="ctr"/>
-              <a:r>
-                <a:rPr lang="en-US" sz="1200">
-                  <a:latin typeface="+mj-lt"/>
-                  <a:cs typeface="Arial" panose="020B0604020202020204" pitchFamily="34" charset="0"/>
-                </a:rPr>
-                <a:t>20YY</a:t>
-              </a:r>
-            </a:p>
-          </p:txBody>
-        </p:sp>
-      </p:grpSp>
-      <p:grpSp>
-        <p:nvGrpSpPr>
-          <p:cNvPr id="27" name="Group 26" descr="Legend">
-            <a:extLst>
-              <a:ext uri="{FF2B5EF4-FFF2-40B4-BE49-F238E27FC236}">
-                <a16:creationId xmlns:a16="http://schemas.microsoft.com/office/drawing/2014/main" id="{185941C3-F2C4-4ED9-8CCB-E54367B26F03}"/>
-              </a:ext>
-            </a:extLst>
-          </p:cNvPr>
-          <p:cNvGrpSpPr/>
-          <p:nvPr/>
-        </p:nvGrpSpPr>
-        <p:grpSpPr>
-          <a:xfrm>
-            <a:off x="8665608" y="6398736"/>
-            <a:ext cx="3140332" cy="189195"/>
-            <a:chOff x="463230" y="14650847"/>
-            <a:chExt cx="3140332" cy="189195"/>
-          </a:xfrm>
-        </p:grpSpPr>
-        <p:sp>
-          <p:nvSpPr>
-            <p:cNvPr id="28" name="TextBox 27">
-              <a:extLst>
-                <a:ext uri="{FF2B5EF4-FFF2-40B4-BE49-F238E27FC236}">
-                  <a16:creationId xmlns:a16="http://schemas.microsoft.com/office/drawing/2014/main" id="{12950859-3B08-45AC-9183-884B944FF29D}"/>
-                </a:ext>
-              </a:extLst>
-            </p:cNvPr>
-            <p:cNvSpPr txBox="1"/>
-            <p:nvPr/>
-          </p:nvSpPr>
-          <p:spPr>
-            <a:xfrm>
-              <a:off x="730693" y="14650847"/>
-              <a:ext cx="676286" cy="189195"/>
-            </a:xfrm>
-            <a:prstGeom prst="rect">
-              <a:avLst/>
-            </a:prstGeom>
-            <a:noFill/>
-          </p:spPr>
-          <p:txBody>
-            <a:bodyPr wrap="square" lIns="0" tIns="0" rIns="0" bIns="0" rtlCol="0">
-              <a:noAutofit/>
-            </a:bodyPr>
-            <a:lstStyle/>
-            <a:p>
-              <a:r>
-                <a:rPr lang="en-US" sz="1200">
-                  <a:latin typeface="+mj-lt"/>
-                </a:rPr>
-                <a:t>Data A</a:t>
-              </a:r>
-            </a:p>
-          </p:txBody>
-        </p:sp>
-        <p:sp>
-          <p:nvSpPr>
-            <p:cNvPr id="29" name="TextBox 28">
-              <a:extLst>
-                <a:ext uri="{FF2B5EF4-FFF2-40B4-BE49-F238E27FC236}">
-                  <a16:creationId xmlns:a16="http://schemas.microsoft.com/office/drawing/2014/main" id="{5A6B008C-B746-4D4D-8F60-B368B8FAEA1A}"/>
-                </a:ext>
-              </a:extLst>
-            </p:cNvPr>
-            <p:cNvSpPr txBox="1"/>
-            <p:nvPr/>
-          </p:nvSpPr>
-          <p:spPr>
-            <a:xfrm>
-              <a:off x="1807257" y="14650847"/>
-              <a:ext cx="676286" cy="189195"/>
-            </a:xfrm>
-            <a:prstGeom prst="rect">
-              <a:avLst/>
-            </a:prstGeom>
-            <a:noFill/>
-          </p:spPr>
-          <p:txBody>
-            <a:bodyPr wrap="square" lIns="0" tIns="0" rIns="0" bIns="0" rtlCol="0">
-              <a:noAutofit/>
-            </a:bodyPr>
-            <a:lstStyle/>
-            <a:p>
-              <a:r>
-                <a:rPr lang="en-US" sz="1200">
-                  <a:latin typeface="+mj-lt"/>
-                </a:rPr>
-                <a:t>Data B</a:t>
-              </a:r>
-            </a:p>
-          </p:txBody>
-        </p:sp>
-        <p:sp>
-          <p:nvSpPr>
-            <p:cNvPr id="30" name="Rectangle 29">
-              <a:extLst>
-                <a:ext uri="{FF2B5EF4-FFF2-40B4-BE49-F238E27FC236}">
-                  <a16:creationId xmlns:a16="http://schemas.microsoft.com/office/drawing/2014/main" id="{ACD1BF27-2213-45CE-A667-788F7924C22E}"/>
-                </a:ext>
-                <a:ext uri="{C183D7F6-B498-43B3-948B-1728B52AA6E4}">
-                  <adec:decorative xmlns:adec="http://schemas.microsoft.com/office/drawing/2017/decorative" val="1"/>
-                </a:ext>
-              </a:extLst>
-            </p:cNvPr>
-            <p:cNvSpPr/>
-            <p:nvPr/>
-          </p:nvSpPr>
-          <p:spPr>
-            <a:xfrm>
-              <a:off x="463230" y="14678120"/>
-              <a:ext cx="134649" cy="134649"/>
-            </a:xfrm>
-            <a:prstGeom prst="rect">
-              <a:avLst/>
-            </a:prstGeom>
-            <a:solidFill>
-              <a:schemeClr val="accent2"/>
-            </a:solidFill>
-            <a:ln w="22225">
-              <a:noFill/>
-            </a:ln>
-          </p:spPr>
-          <p:style>
-            <a:lnRef idx="2">
-              <a:schemeClr val="accent1">
-                <a:shade val="50000"/>
-              </a:schemeClr>
-            </a:lnRef>
-            <a:fillRef idx="1">
-              <a:schemeClr val="accent1"/>
-            </a:fillRef>
-            <a:effectRef idx="0">
-              <a:schemeClr val="accent1"/>
-            </a:effectRef>
-            <a:fontRef idx="minor">
-              <a:schemeClr val="lt1"/>
-            </a:fontRef>
-          </p:style>
-          <p:txBody>
-            <a:bodyPr rtlCol="0" anchor="ctr"/>
-            <a:lstStyle/>
-            <a:p>
-              <a:pPr algn="ctr"/>
-              <a:endParaRPr lang="en-US">
-                <a:solidFill>
-                  <a:schemeClr val="tx1"/>
-                </a:solidFill>
-                <a:latin typeface="+mj-lt"/>
-              </a:endParaRPr>
-            </a:p>
-          </p:txBody>
-        </p:sp>
-        <p:sp>
-          <p:nvSpPr>
-            <p:cNvPr id="31" name="Rectangle 30">
-              <a:extLst>
-                <a:ext uri="{FF2B5EF4-FFF2-40B4-BE49-F238E27FC236}">
-                  <a16:creationId xmlns:a16="http://schemas.microsoft.com/office/drawing/2014/main" id="{54F87B6B-A885-4EEB-8E55-6E1DA1BD0EA8}"/>
-                </a:ext>
-                <a:ext uri="{C183D7F6-B498-43B3-948B-1728B52AA6E4}">
-                  <adec:decorative xmlns:adec="http://schemas.microsoft.com/office/drawing/2017/decorative" val="1"/>
-                </a:ext>
-              </a:extLst>
-            </p:cNvPr>
-            <p:cNvSpPr/>
-            <p:nvPr/>
-          </p:nvSpPr>
-          <p:spPr>
-            <a:xfrm>
-              <a:off x="1539794" y="14678120"/>
-              <a:ext cx="134649" cy="134649"/>
-            </a:xfrm>
-            <a:prstGeom prst="rect">
-              <a:avLst/>
-            </a:prstGeom>
-            <a:solidFill>
-              <a:schemeClr val="accent4"/>
-            </a:solidFill>
-            <a:ln>
-              <a:noFill/>
-            </a:ln>
-          </p:spPr>
-          <p:style>
-            <a:lnRef idx="2">
-              <a:schemeClr val="accent1">
-                <a:shade val="50000"/>
-              </a:schemeClr>
-            </a:lnRef>
-            <a:fillRef idx="1">
-              <a:schemeClr val="accent1"/>
-            </a:fillRef>
-            <a:effectRef idx="0">
-              <a:schemeClr val="accent1"/>
-            </a:effectRef>
-            <a:fontRef idx="minor">
-              <a:schemeClr val="lt1"/>
-            </a:fontRef>
-          </p:style>
-          <p:txBody>
-            <a:bodyPr rtlCol="0" anchor="ctr"/>
-            <a:lstStyle/>
-            <a:p>
-              <a:pPr algn="ctr"/>
-              <a:endParaRPr lang="en-US">
-                <a:solidFill>
-                  <a:schemeClr val="tx1"/>
-                </a:solidFill>
-                <a:latin typeface="+mj-lt"/>
-              </a:endParaRPr>
-            </a:p>
-          </p:txBody>
-        </p:sp>
-        <p:sp>
-          <p:nvSpPr>
-            <p:cNvPr id="32" name="Rectangle 31">
-              <a:extLst>
-                <a:ext uri="{FF2B5EF4-FFF2-40B4-BE49-F238E27FC236}">
-                  <a16:creationId xmlns:a16="http://schemas.microsoft.com/office/drawing/2014/main" id="{EB4B2BC6-FC0E-4408-9491-47D196A52DE9}"/>
-                </a:ext>
-                <a:ext uri="{C183D7F6-B498-43B3-948B-1728B52AA6E4}">
-                  <adec:decorative xmlns:adec="http://schemas.microsoft.com/office/drawing/2017/decorative" val="1"/>
-                </a:ext>
-              </a:extLst>
-            </p:cNvPr>
-            <p:cNvSpPr/>
-            <p:nvPr/>
-          </p:nvSpPr>
-          <p:spPr>
-            <a:xfrm>
-              <a:off x="2616358" y="14678120"/>
-              <a:ext cx="134649" cy="134649"/>
-            </a:xfrm>
-            <a:prstGeom prst="rect">
-              <a:avLst/>
-            </a:prstGeom>
-            <a:solidFill>
-              <a:schemeClr val="accent5"/>
-            </a:solidFill>
-            <a:ln>
-              <a:noFill/>
-            </a:ln>
-          </p:spPr>
-          <p:style>
-            <a:lnRef idx="2">
-              <a:schemeClr val="accent1">
-                <a:shade val="50000"/>
-              </a:schemeClr>
-            </a:lnRef>
-            <a:fillRef idx="1">
-              <a:schemeClr val="accent1"/>
-            </a:fillRef>
-            <a:effectRef idx="0">
-              <a:schemeClr val="accent1"/>
-            </a:effectRef>
-            <a:fontRef idx="minor">
-              <a:schemeClr val="lt1"/>
-            </a:fontRef>
-          </p:style>
-          <p:txBody>
-            <a:bodyPr rtlCol="0" anchor="ctr"/>
-            <a:lstStyle/>
-            <a:p>
-              <a:pPr algn="ctr"/>
-              <a:endParaRPr lang="en-US">
-                <a:solidFill>
-                  <a:schemeClr val="tx1"/>
-                </a:solidFill>
-                <a:latin typeface="+mj-lt"/>
-              </a:endParaRPr>
-            </a:p>
-          </p:txBody>
-        </p:sp>
-        <p:sp>
-          <p:nvSpPr>
-            <p:cNvPr id="33" name="TextBox 32">
-              <a:extLst>
-                <a:ext uri="{FF2B5EF4-FFF2-40B4-BE49-F238E27FC236}">
-                  <a16:creationId xmlns:a16="http://schemas.microsoft.com/office/drawing/2014/main" id="{F7BC13C6-1FE2-4F17-B99D-CC390711E793}"/>
-                </a:ext>
-              </a:extLst>
-            </p:cNvPr>
-            <p:cNvSpPr txBox="1"/>
-            <p:nvPr/>
-          </p:nvSpPr>
-          <p:spPr>
-            <a:xfrm>
-              <a:off x="2927276" y="14650847"/>
-              <a:ext cx="676286" cy="189195"/>
-            </a:xfrm>
-            <a:prstGeom prst="rect">
-              <a:avLst/>
-            </a:prstGeom>
-            <a:noFill/>
-          </p:spPr>
-          <p:txBody>
-            <a:bodyPr wrap="square" lIns="0" tIns="0" rIns="0" bIns="0" rtlCol="0">
-              <a:noAutofit/>
-            </a:bodyPr>
-            <a:lstStyle/>
-            <a:p>
-              <a:r>
-                <a:rPr lang="en-US" sz="1200">
-                  <a:latin typeface="+mj-lt"/>
-                </a:rPr>
-                <a:t>Data C</a:t>
-              </a:r>
-            </a:p>
-          </p:txBody>
-        </p:sp>
-      </p:grpSp>
-      <p:sp>
-        <p:nvSpPr>
-          <p:cNvPr id="4" name="Slide Number Placeholder 3">
-            <a:extLst>
-              <a:ext uri="{FF2B5EF4-FFF2-40B4-BE49-F238E27FC236}">
-                <a16:creationId xmlns:a16="http://schemas.microsoft.com/office/drawing/2014/main" id="{903996C0-0A7C-4905-8FD4-EC23739737EE}"/>
-              </a:ext>
-            </a:extLst>
-          </p:cNvPr>
-          <p:cNvSpPr>
-            <a:spLocks noGrp="1"/>
-          </p:cNvSpPr>
-          <p:nvPr>
-            <p:ph type="sldNum" sz="quarter" idx="14"/>
-          </p:nvPr>
-        </p:nvSpPr>
-        <p:spPr>
-          <a:gradFill flip="none" rotWithShape="1">
-            <a:gsLst>
-              <a:gs pos="0">
-                <a:schemeClr val="accent2">
-                  <a:lumMod val="75000"/>
-                  <a:shade val="30000"/>
-                  <a:satMod val="115000"/>
-                </a:schemeClr>
-              </a:gs>
-              <a:gs pos="47000">
-                <a:schemeClr val="accent2">
-                  <a:lumMod val="75000"/>
-                  <a:shade val="67500"/>
-                  <a:satMod val="115000"/>
-                </a:schemeClr>
-              </a:gs>
-              <a:gs pos="100000">
-                <a:schemeClr val="accent1"/>
-              </a:gs>
-            </a:gsLst>
-            <a:lin ang="10800000" scaled="0"/>
-            <a:tileRect/>
-          </a:gradFill>
-        </p:spPr>
-        <p:txBody>
-          <a:bodyPr/>
-          <a:lstStyle/>
-          <a:p>
-            <a:fld id="{058DB212-BFA2-403F-85EF-DFD3FF6D973A}" type="slidenum">
-              <a:rPr lang="en-US" smtClean="0"/>
-              <a:pPr/>
-              <a:t>9</a:t>
-            </a:fld>
-            <a:endParaRPr lang="en-US"/>
-          </a:p>
-        </p:txBody>
-      </p:sp>
-      <p:sp>
-        <p:nvSpPr>
-          <p:cNvPr id="17" name="Slide Number Placeholder 7">
-            <a:extLst>
-              <a:ext uri="{FF2B5EF4-FFF2-40B4-BE49-F238E27FC236}">
-                <a16:creationId xmlns:a16="http://schemas.microsoft.com/office/drawing/2014/main" id="{6EC26857-9544-4562-AFF0-72E069063874}"/>
-              </a:ext>
-            </a:extLst>
-          </p:cNvPr>
-          <p:cNvSpPr txBox="1">
-            <a:spLocks/>
-          </p:cNvSpPr>
-          <p:nvPr/>
-        </p:nvSpPr>
-        <p:spPr>
-          <a:xfrm>
-            <a:off x="7806812" y="6689019"/>
-            <a:ext cx="3785419" cy="155729"/>
-          </a:xfrm>
-          <a:prstGeom prst="rect">
-            <a:avLst/>
-          </a:prstGeom>
-          <a:gradFill>
-            <a:gsLst>
-              <a:gs pos="87598">
-                <a:schemeClr val="accent5">
-                  <a:lumMod val="75000"/>
-                </a:schemeClr>
-              </a:gs>
-              <a:gs pos="0">
-                <a:schemeClr val="accent4">
-                  <a:lumMod val="60000"/>
-                  <a:lumOff val="40000"/>
-                </a:schemeClr>
-              </a:gs>
-              <a:gs pos="47000">
-                <a:schemeClr val="accent2">
-                  <a:lumMod val="75000"/>
-                  <a:shade val="67500"/>
-                  <a:satMod val="115000"/>
-                </a:schemeClr>
-              </a:gs>
-              <a:gs pos="100000">
-                <a:schemeClr val="accent1"/>
-              </a:gs>
-            </a:gsLst>
-            <a:lin ang="10800000" scaled="0"/>
-          </a:gradFill>
-        </p:spPr>
-        <p:txBody>
-          <a:bodyPr vert="horz" lIns="0" tIns="0" rIns="72000" bIns="0" rtlCol="0" anchor="ctr"/>
-          <a:lstStyle>
-            <a:defPPr>
-              <a:defRPr lang="en-US"/>
-            </a:defPPr>
-            <a:lvl1pPr marL="0" algn="r" defTabSz="914400" rtl="0" eaLnBrk="1" latinLnBrk="0" hangingPunct="1">
-              <a:defRPr sz="1200" kern="1200">
-                <a:solidFill>
-                  <a:schemeClr val="bg1"/>
-                </a:solidFill>
-                <a:latin typeface="+mj-lt"/>
-                <a:ea typeface="+mn-ea"/>
-                <a:cs typeface="+mn-cs"/>
-              </a:defRPr>
-            </a:lvl1pPr>
-            <a:lvl2pPr marL="457200" algn="l" defTabSz="914400" rtl="0" eaLnBrk="1" latinLnBrk="0" hangingPunct="1">
-              <a:defRPr sz="1800" kern="1200">
-                <a:solidFill>
-                  <a:schemeClr val="tx1"/>
-                </a:solidFill>
-                <a:latin typeface="+mn-lt"/>
-                <a:ea typeface="+mn-ea"/>
-                <a:cs typeface="+mn-cs"/>
-              </a:defRPr>
-            </a:lvl2pPr>
-            <a:lvl3pPr marL="914400" algn="l" defTabSz="914400" rtl="0" eaLnBrk="1" latinLnBrk="0" hangingPunct="1">
-              <a:defRPr sz="1800" kern="1200">
-                <a:solidFill>
-                  <a:schemeClr val="tx1"/>
-                </a:solidFill>
-                <a:latin typeface="+mn-lt"/>
-                <a:ea typeface="+mn-ea"/>
-                <a:cs typeface="+mn-cs"/>
-              </a:defRPr>
-            </a:lvl3pPr>
-            <a:lvl4pPr marL="1371600" algn="l" defTabSz="914400" rtl="0" eaLnBrk="1" latinLnBrk="0" hangingPunct="1">
-              <a:defRPr sz="1800" kern="1200">
-                <a:solidFill>
-                  <a:schemeClr val="tx1"/>
-                </a:solidFill>
-                <a:latin typeface="+mn-lt"/>
-                <a:ea typeface="+mn-ea"/>
-                <a:cs typeface="+mn-cs"/>
-              </a:defRPr>
-            </a:lvl4pPr>
-            <a:lvl5pPr marL="1828800" algn="l" defTabSz="914400" rtl="0" eaLnBrk="1" latinLnBrk="0" hangingPunct="1">
-              <a:defRPr sz="1800" kern="1200">
-                <a:solidFill>
-                  <a:schemeClr val="tx1"/>
-                </a:solidFill>
-                <a:latin typeface="+mn-lt"/>
-                <a:ea typeface="+mn-ea"/>
-                <a:cs typeface="+mn-cs"/>
-              </a:defRPr>
-            </a:lvl5pPr>
-            <a:lvl6pPr marL="2286000" algn="l" defTabSz="914400" rtl="0" eaLnBrk="1" latinLnBrk="0" hangingPunct="1">
-              <a:defRPr sz="1800" kern="1200">
-                <a:solidFill>
-                  <a:schemeClr val="tx1"/>
-                </a:solidFill>
-                <a:latin typeface="+mn-lt"/>
-                <a:ea typeface="+mn-ea"/>
-                <a:cs typeface="+mn-cs"/>
-              </a:defRPr>
-            </a:lvl6pPr>
-            <a:lvl7pPr marL="2743200" algn="l" defTabSz="914400" rtl="0" eaLnBrk="1" latinLnBrk="0" hangingPunct="1">
-              <a:defRPr sz="1800" kern="1200">
-                <a:solidFill>
-                  <a:schemeClr val="tx1"/>
-                </a:solidFill>
-                <a:latin typeface="+mn-lt"/>
-                <a:ea typeface="+mn-ea"/>
-                <a:cs typeface="+mn-cs"/>
-              </a:defRPr>
-            </a:lvl7pPr>
-            <a:lvl8pPr marL="3200400" algn="l" defTabSz="914400" rtl="0" eaLnBrk="1" latinLnBrk="0" hangingPunct="1">
-              <a:defRPr sz="1800" kern="1200">
-                <a:solidFill>
-                  <a:schemeClr val="tx1"/>
-                </a:solidFill>
-                <a:latin typeface="+mn-lt"/>
-                <a:ea typeface="+mn-ea"/>
-                <a:cs typeface="+mn-cs"/>
-              </a:defRPr>
-            </a:lvl8pPr>
-            <a:lvl9pPr marL="3657600" algn="l" defTabSz="914400" rtl="0" eaLnBrk="1" latinLnBrk="0" hangingPunct="1">
-              <a:defRPr sz="1800" kern="1200">
-                <a:solidFill>
-                  <a:schemeClr val="tx1"/>
-                </a:solidFill>
-                <a:latin typeface="+mn-lt"/>
-                <a:ea typeface="+mn-ea"/>
-                <a:cs typeface="+mn-cs"/>
-              </a:defRPr>
-            </a:lvl9pPr>
-          </a:lstStyle>
-          <a:p>
-            <a:r>
-              <a:rPr lang="en-US" dirty="0"/>
-              <a:t>PES Data Science Presentation</a:t>
-            </a:r>
-          </a:p>
-        </p:txBody>
-      </p:sp>
-    </p:spTree>
-    <p:extLst>
-      <p:ext uri="{BB962C8B-B14F-4D97-AF65-F5344CB8AC3E}">
-        <p14:creationId xmlns:p14="http://schemas.microsoft.com/office/powerpoint/2010/main" val="1177584907"/>
       </p:ext>
     </p:extLst>
   </p:cSld>

</xml_diff>